<commit_message>
Minor changes in the submission files
</commit_message>
<xml_diff>
--- a/Abgabe/Asset_Pricing_Fallstudie.pptx
+++ b/Abgabe/Asset_Pricing_Fallstudie.pptx
@@ -2720,12 +2720,12 @@
         <a:fontRef idx="minor"/>
       </dsp:style>
       <dsp:txBody>
-        <a:bodyPr spcFirstLastPara="0" vert="horz" wrap="square" lIns="78232" tIns="6985" rIns="6985" bIns="6985" numCol="1" spcCol="1270" anchor="ctr" anchorCtr="0">
+        <a:bodyPr spcFirstLastPara="0" vert="horz" wrap="square" lIns="71120" tIns="6350" rIns="6350" bIns="6350" numCol="1" spcCol="1270" anchor="ctr" anchorCtr="0">
           <a:noAutofit/>
         </a:bodyPr>
         <a:lstStyle/>
         <a:p>
-          <a:pPr marL="57150" lvl="1" indent="-57150" algn="l" defTabSz="488950">
+          <a:pPr marL="57150" lvl="1" indent="-57150" algn="l" defTabSz="444500">
             <a:lnSpc>
               <a:spcPct val="90000"/>
             </a:lnSpc>
@@ -2738,13 +2738,13 @@
             <a:buChar char="•"/>
           </a:pPr>
           <a:r>
-            <a:rPr lang="de-DE" sz="1100" kern="1200"/>
+            <a:rPr lang="de-DE" sz="1000" kern="1200"/>
             <a:t>Ein Monat Gap zwischen Bewertung und Bildung des Portfolios (t-12 bis t-2)</a:t>
           </a:r>
-          <a:endParaRPr lang="en-US" sz="1100" kern="1200"/>
+          <a:endParaRPr lang="en-US" sz="1000" kern="1200"/>
         </a:p>
         <a:p>
-          <a:pPr marL="57150" lvl="1" indent="-57150" algn="l" defTabSz="488950">
+          <a:pPr marL="57150" lvl="1" indent="-57150" algn="l" defTabSz="444500">
             <a:lnSpc>
               <a:spcPct val="90000"/>
             </a:lnSpc>
@@ -2757,10 +2757,10 @@
             <a:buChar char="•"/>
           </a:pPr>
           <a:r>
-            <a:rPr lang="de-DE" sz="1100" kern="1200"/>
+            <a:rPr lang="de-DE" sz="1000" kern="1200"/>
             <a:t>Mindestens 8 Returns verfügbar in betrachtetem Zeitraum</a:t>
           </a:r>
-          <a:endParaRPr lang="en-US" sz="1100" kern="1200"/>
+          <a:endParaRPr lang="en-US" sz="1000" kern="1200"/>
         </a:p>
       </dsp:txBody>
       <dsp:txXfrm rot="-5400000">
@@ -2894,12 +2894,12 @@
         <a:fontRef idx="minor"/>
       </dsp:style>
       <dsp:txBody>
-        <a:bodyPr spcFirstLastPara="0" vert="horz" wrap="square" lIns="78232" tIns="6985" rIns="6985" bIns="6985" numCol="1" spcCol="1270" anchor="ctr" anchorCtr="0">
+        <a:bodyPr spcFirstLastPara="0" vert="horz" wrap="square" lIns="71120" tIns="6350" rIns="6350" bIns="6350" numCol="1" spcCol="1270" anchor="ctr" anchorCtr="0">
           <a:noAutofit/>
         </a:bodyPr>
         <a:lstStyle/>
         <a:p>
-          <a:pPr marL="57150" lvl="1" indent="-57150" algn="l" defTabSz="488950">
+          <a:pPr marL="57150" lvl="1" indent="-57150" algn="l" defTabSz="444500">
             <a:lnSpc>
               <a:spcPct val="90000"/>
             </a:lnSpc>
@@ -2912,13 +2912,13 @@
             <a:buChar char="•"/>
           </a:pPr>
           <a:r>
-            <a:rPr lang="de-DE" sz="1100" kern="1200"/>
+            <a:rPr lang="de-DE" sz="1000" kern="1200"/>
             <a:t>Unterteilung der Renditen in Dezile pro Monatscheibe</a:t>
           </a:r>
-          <a:endParaRPr lang="en-US" sz="1100" kern="1200"/>
+          <a:endParaRPr lang="en-US" sz="1000" kern="1200"/>
         </a:p>
         <a:p>
-          <a:pPr marL="57150" lvl="1" indent="-57150" algn="l" defTabSz="488950">
+          <a:pPr marL="57150" lvl="1" indent="-57150" algn="l" defTabSz="444500">
             <a:lnSpc>
               <a:spcPct val="90000"/>
             </a:lnSpc>
@@ -2931,10 +2931,10 @@
             <a:buChar char="•"/>
           </a:pPr>
           <a:r>
-            <a:rPr lang="de-DE" sz="1100" kern="1200" dirty="0"/>
+            <a:rPr lang="de-DE" sz="1000" kern="1200" dirty="0"/>
             <a:t>Extraktion Winner &amp; Loser Dezil</a:t>
           </a:r>
-          <a:endParaRPr lang="en-US" sz="1100" kern="1200" dirty="0"/>
+          <a:endParaRPr lang="en-US" sz="1000" kern="1200" dirty="0"/>
         </a:p>
       </dsp:txBody>
       <dsp:txXfrm rot="-5400000">
@@ -3068,12 +3068,12 @@
         <a:fontRef idx="minor"/>
       </dsp:style>
       <dsp:txBody>
-        <a:bodyPr spcFirstLastPara="0" vert="horz" wrap="square" lIns="78232" tIns="6985" rIns="6985" bIns="6985" numCol="1" spcCol="1270" anchor="ctr" anchorCtr="0">
+        <a:bodyPr spcFirstLastPara="0" vert="horz" wrap="square" lIns="71120" tIns="6350" rIns="6350" bIns="6350" numCol="1" spcCol="1270" anchor="ctr" anchorCtr="0">
           <a:noAutofit/>
         </a:bodyPr>
         <a:lstStyle/>
         <a:p>
-          <a:pPr marL="57150" lvl="1" indent="-57150" algn="l" defTabSz="488950">
+          <a:pPr marL="57150" lvl="1" indent="-57150" algn="l" defTabSz="444500">
             <a:lnSpc>
               <a:spcPct val="90000"/>
             </a:lnSpc>
@@ -3086,10 +3086,10 @@
             <a:buChar char="•"/>
           </a:pPr>
           <a:r>
-            <a:rPr lang="de-DE" sz="1100" kern="1200" dirty="0"/>
+            <a:rPr lang="de-DE" sz="1000" kern="1200" dirty="0"/>
             <a:t>Gewichtung innerhalb des Dezils anhand der Marktkapitalisierung</a:t>
           </a:r>
-          <a:endParaRPr lang="en-US" sz="1100" kern="1200" dirty="0"/>
+          <a:endParaRPr lang="en-US" sz="1000" kern="1200" dirty="0"/>
         </a:p>
       </dsp:txBody>
       <dsp:txXfrm rot="-5400000">
@@ -3223,12 +3223,12 @@
         <a:fontRef idx="minor"/>
       </dsp:style>
       <dsp:txBody>
-        <a:bodyPr spcFirstLastPara="0" vert="horz" wrap="square" lIns="78232" tIns="6985" rIns="6985" bIns="6985" numCol="1" spcCol="1270" anchor="ctr" anchorCtr="0">
+        <a:bodyPr spcFirstLastPara="0" vert="horz" wrap="square" lIns="71120" tIns="6350" rIns="6350" bIns="6350" numCol="1" spcCol="1270" anchor="ctr" anchorCtr="0">
           <a:noAutofit/>
         </a:bodyPr>
         <a:lstStyle/>
         <a:p>
-          <a:pPr marL="57150" lvl="1" indent="-57150" algn="l" defTabSz="488950">
+          <a:pPr marL="57150" lvl="1" indent="-57150" algn="l" defTabSz="444500">
             <a:lnSpc>
               <a:spcPct val="90000"/>
             </a:lnSpc>
@@ -3241,7 +3241,7 @@
             <a:buChar char="•"/>
           </a:pPr>
           <a:r>
-            <a:rPr lang="de-DE" sz="1100" kern="1200"/>
+            <a:rPr lang="de-DE" sz="1000" kern="1200"/>
             <a:t>Winner long, Loser short</a:t>
           </a:r>
         </a:p>
@@ -7907,7 +7907,7 @@
                 </a:solidFill>
               </a:rPr>
               <a:pPr/>
-              <a:t>25.06.2020</a:t>
+              <a:t>29.06.2020</a:t>
             </a:fld>
             <a:endParaRPr lang="de-DE" sz="900">
               <a:solidFill>
@@ -9090,13 +9090,13 @@
         </p:nvPicPr>
         <p:blipFill rotWithShape="1">
           <a:blip r:embed="rId2"/>
-          <a:srcRect r="2" b="19033"/>
+          <a:srcRect t="4596" r="2" b="413"/>
           <a:stretch/>
         </p:blipFill>
         <p:spPr>
           <a:xfrm>
-            <a:off x="392113" y="898922"/>
-            <a:ext cx="8356600" cy="3670697"/>
+            <a:off x="392113" y="807242"/>
+            <a:ext cx="8316118" cy="3864772"/>
           </a:xfrm>
           <a:noFill/>
         </p:spPr>
@@ -10979,7 +10979,7 @@
         </p:nvSpPr>
         <p:spPr>
           <a:xfrm>
-            <a:off x="392113" y="898922"/>
+            <a:off x="392113" y="870346"/>
             <a:ext cx="8356600" cy="3670697"/>
           </a:xfrm>
         </p:spPr>
@@ -10997,10 +10997,34 @@
           </a:p>
           <a:p>
             <a:r>
-              <a:rPr lang="de-DE" sz="1800"/>
-              <a:t>Behavioral Finance [Asness, Frazzini, Israel u. Moskowitz 2014, S. 88]</a:t>
-            </a:r>
-            <a:endParaRPr lang="de-DE" sz="1800">
+              <a:rPr lang="de-DE" sz="1800" dirty="0"/>
+              <a:t>Behavioral Finance [</a:t>
+            </a:r>
+            <a:r>
+              <a:rPr lang="de-DE" sz="1800" dirty="0" err="1"/>
+              <a:t>Asness</a:t>
+            </a:r>
+            <a:r>
+              <a:rPr lang="de-DE" sz="1800" dirty="0"/>
+              <a:t>, </a:t>
+            </a:r>
+            <a:r>
+              <a:rPr lang="de-DE" sz="1800" dirty="0" err="1"/>
+              <a:t>Frazzini</a:t>
+            </a:r>
+            <a:r>
+              <a:rPr lang="de-DE" sz="1800" dirty="0"/>
+              <a:t>, Israel u. </a:t>
+            </a:r>
+            <a:r>
+              <a:rPr lang="de-DE" sz="1800" dirty="0" err="1"/>
+              <a:t>Moskowitz</a:t>
+            </a:r>
+            <a:r>
+              <a:rPr lang="de-DE" sz="1800" dirty="0"/>
+              <a:t> 2014, S. 88]</a:t>
+            </a:r>
+            <a:endParaRPr lang="de-DE" sz="1800" dirty="0">
               <a:cs typeface="Arial"/>
             </a:endParaRPr>
           </a:p>
@@ -11041,58 +11065,72 @@
           </a:p>
           <a:p>
             <a:r>
-              <a:rPr lang="de-DE" sz="1800"/>
+              <a:rPr lang="de-DE" sz="1800" dirty="0"/>
               <a:t>Extreme Rückschläge (1932, 2009) sind klares Argument gegen Momentum-Strategien (langwierige Erholung) [</a:t>
             </a:r>
             <a:r>
-              <a:rPr lang="de-DE" sz="1800">
+              <a:rPr lang="de-DE" sz="1800" dirty="0">
                 <a:ea typeface="+mn-lt"/>
                 <a:cs typeface="+mn-lt"/>
               </a:rPr>
               <a:t>Barroso u. Santa-Clara 2015</a:t>
             </a:r>
             <a:r>
-              <a:rPr lang="de-DE" sz="1800"/>
-              <a:t>, S. 112</a:t>
-            </a:r>
-            <a:r>
               <a:rPr lang="de-DE" sz="1800" dirty="0"/>
-              <a:t>]</a:t>
-            </a:r>
-            <a:endParaRPr lang="de-DE" sz="1800">
+              <a:t>, S. 112]</a:t>
+            </a:r>
+            <a:endParaRPr lang="de-DE" sz="1800" dirty="0">
               <a:cs typeface="Arial"/>
             </a:endParaRPr>
           </a:p>
           <a:p>
             <a:r>
-              <a:rPr lang="de-DE" sz="1800"/>
-              <a:t>Transaktionskosten und Steuern nicht berücksichtigt [Lesmond, Schill u. Zhou 2003, S. 19-20]</a:t>
-            </a:r>
-            <a:endParaRPr lang="de-DE" sz="1800">
+              <a:rPr lang="de-DE" sz="1800" dirty="0"/>
+              <a:t>Transaktionskosten und Steuern nicht berücksichtigt [</a:t>
+            </a:r>
+            <a:r>
+              <a:rPr lang="de-DE" sz="1800" dirty="0" err="1"/>
+              <a:t>Lesmond</a:t>
+            </a:r>
+            <a:r>
+              <a:rPr lang="de-DE" sz="1800" dirty="0"/>
+              <a:t>, Schill u. Zhou 2003, S. 19-20]</a:t>
+            </a:r>
+            <a:endParaRPr lang="de-DE" sz="1800" dirty="0">
               <a:cs typeface="Arial"/>
             </a:endParaRPr>
           </a:p>
           <a:p>
             <a:r>
-              <a:rPr lang="de-DE" sz="1800"/>
+              <a:rPr lang="de-DE" sz="1800" dirty="0"/>
               <a:t>Mit dem Stochastischen Diskontfaktor gewichtete Returns deutlich niedriger [</a:t>
             </a:r>
             <a:r>
-              <a:rPr lang="de-DE" sz="1800">
+              <a:rPr lang="de-DE" sz="1800" dirty="0">
                 <a:ea typeface="+mn-lt"/>
                 <a:cs typeface="+mn-lt"/>
               </a:rPr>
-              <a:t>Cooper, Gutierrez u. Hameed 2005</a:t>
-            </a:r>
-            <a:r>
-              <a:rPr lang="de-DE" sz="1800"/>
-              <a:t>, S. 1347</a:t>
+              <a:t>Cooper, Gutierrez u. </a:t>
+            </a:r>
+            <a:r>
+              <a:rPr lang="de-DE" sz="1800" dirty="0" err="1">
+                <a:ea typeface="+mn-lt"/>
+                <a:cs typeface="+mn-lt"/>
+              </a:rPr>
+              <a:t>Hameed</a:t>
+            </a:r>
+            <a:r>
+              <a:rPr lang="de-DE" sz="1800" dirty="0">
+                <a:ea typeface="+mn-lt"/>
+                <a:cs typeface="+mn-lt"/>
+              </a:rPr>
+              <a:t> 2005</a:t>
             </a:r>
             <a:r>
               <a:rPr lang="de-DE" sz="1800" dirty="0"/>
-              <a:t>]</a:t>
-            </a:r>
-            <a:endParaRPr lang="de-DE" sz="1800">
+              <a:t>, S. 1347]</a:t>
+            </a:r>
+            <a:endParaRPr lang="de-DE" sz="1800" dirty="0">
               <a:cs typeface="Arial"/>
             </a:endParaRPr>
           </a:p>
@@ -12909,12 +12947,9 @@
 </file>
 
 <file path=customXml/item1.xml><?xml version="1.0" encoding="utf-8"?>
-<?mso-contentType ?>
-<FormTemplates xmlns="http://schemas.microsoft.com/sharepoint/v3/contenttype/forms">
-  <Display>DocumentLibraryForm</Display>
-  <Edit>DocumentLibraryForm</Edit>
-  <New>DocumentLibraryForm</New>
-</FormTemplates>
+<p:properties xmlns:p="http://schemas.microsoft.com/office/2006/metadata/properties" xmlns:xsi="http://www.w3.org/2001/XMLSchema-instance" xmlns:pc="http://schemas.microsoft.com/office/infopath/2007/PartnerControls">
+  <documentManagement/>
+</p:properties>
 </file>
 
 <file path=customXml/item2.xml><?xml version="1.0" encoding="utf-8"?>
@@ -13064,15 +13099,26 @@
 </file>
 
 <file path=customXml/item3.xml><?xml version="1.0" encoding="utf-8"?>
-<p:properties xmlns:p="http://schemas.microsoft.com/office/2006/metadata/properties" xmlns:xsi="http://www.w3.org/2001/XMLSchema-instance" xmlns:pc="http://schemas.microsoft.com/office/infopath/2007/PartnerControls">
-  <documentManagement/>
-</p:properties>
+<?mso-contentType ?>
+<FormTemplates xmlns="http://schemas.microsoft.com/sharepoint/v3/contenttype/forms">
+  <Display>DocumentLibraryForm</Display>
+  <Edit>DocumentLibraryForm</Edit>
+  <New>DocumentLibraryForm</New>
+</FormTemplates>
 </file>
 
 <file path=customXml/itemProps1.xml><?xml version="1.0" encoding="utf-8"?>
-<ds:datastoreItem xmlns:ds="http://schemas.openxmlformats.org/officeDocument/2006/customXml" ds:itemID="{3507CE4D-09A3-40A3-BF9D-6A0C13944230}">
+<ds:datastoreItem xmlns:ds="http://schemas.openxmlformats.org/officeDocument/2006/customXml" ds:itemID="{D568C4AE-2627-4CD6-808B-84EE17CBFB5F}">
   <ds:schemaRefs>
-    <ds:schemaRef ds:uri="http://schemas.microsoft.com/sharepoint/v3/contenttype/forms"/>
+    <ds:schemaRef ds:uri="6fcfeaee-f31b-4194-b32e-7384e0ea288c"/>
+    <ds:schemaRef ds:uri="http://purl.org/dc/dcmitype/"/>
+    <ds:schemaRef ds:uri="http://purl.org/dc/elements/1.1/"/>
+    <ds:schemaRef ds:uri="http://purl.org/dc/terms/"/>
+    <ds:schemaRef ds:uri="http://schemas.microsoft.com/office/2006/documentManagement/types"/>
+    <ds:schemaRef ds:uri="http://schemas.microsoft.com/office/2006/metadata/properties"/>
+    <ds:schemaRef ds:uri="http://schemas.microsoft.com/office/infopath/2007/PartnerControls"/>
+    <ds:schemaRef ds:uri="http://schemas.openxmlformats.org/package/2006/metadata/core-properties"/>
+    <ds:schemaRef ds:uri="http://www.w3.org/XML/1998/namespace"/>
   </ds:schemaRefs>
 </ds:datastoreItem>
 </file>
@@ -13096,17 +13142,9 @@
 </file>
 
 <file path=customXml/itemProps3.xml><?xml version="1.0" encoding="utf-8"?>
-<ds:datastoreItem xmlns:ds="http://schemas.openxmlformats.org/officeDocument/2006/customXml" ds:itemID="{D568C4AE-2627-4CD6-808B-84EE17CBFB5F}">
+<ds:datastoreItem xmlns:ds="http://schemas.openxmlformats.org/officeDocument/2006/customXml" ds:itemID="{3507CE4D-09A3-40A3-BF9D-6A0C13944230}">
   <ds:schemaRefs>
-    <ds:schemaRef ds:uri="6fcfeaee-f31b-4194-b32e-7384e0ea288c"/>
-    <ds:schemaRef ds:uri="http://purl.org/dc/dcmitype/"/>
-    <ds:schemaRef ds:uri="http://purl.org/dc/elements/1.1/"/>
-    <ds:schemaRef ds:uri="http://purl.org/dc/terms/"/>
-    <ds:schemaRef ds:uri="http://schemas.microsoft.com/office/2006/documentManagement/types"/>
-    <ds:schemaRef ds:uri="http://schemas.microsoft.com/office/2006/metadata/properties"/>
-    <ds:schemaRef ds:uri="http://schemas.microsoft.com/office/infopath/2007/PartnerControls"/>
-    <ds:schemaRef ds:uri="http://schemas.openxmlformats.org/package/2006/metadata/core-properties"/>
-    <ds:schemaRef ds:uri="http://www.w3.org/XML/1998/namespace"/>
+    <ds:schemaRef ds:uri="http://schemas.microsoft.com/sharepoint/v3/contenttype/forms"/>
   </ds:schemaRefs>
 </ds:datastoreItem>
 </file>
</xml_diff>